<commit_message>
EC: updated powerpoint to reflect new testing score
</commit_message>
<xml_diff>
--- a/documentation/IMS-Presentation.pptx
+++ b/documentation/IMS-Presentation.pptx
@@ -130,6 +130,7 @@
   <p1510:revLst>
     <p1510:client id="{1756BA73-BE55-4E47-ADB5-7BB01E917AE8}" v="674" dt="2020-11-26T23:22:53.390"/>
     <p1510:client id="{573941BC-C90D-A18C-C50A-693EB9CCC548}" v="1742" dt="2020-11-27T12:30:26.062"/>
+    <p1510:client id="{E36188A6-AC77-E3AE-7AFA-5A6119CCC101}" v="108" dt="2020-12-03T12:10:25.965"/>
     <p1510:client id="{FA310E58-D5F6-1819-A12F-E284F36F98D6}" v="140" dt="2020-12-03T08:58:40.101"/>
   </p1510:revLst>
 </p1510:revInfo>
@@ -3972,10 +3973,10 @@
         <a:lstStyle/>
         <a:p>
           <a:r>
-            <a:rPr lang="en-GB"/>
+            <a:rPr lang="en-GB" dirty="0"/>
             <a:t>What went wrong?</a:t>
           </a:r>
-          <a:endParaRPr lang="en-US"/>
+          <a:endParaRPr lang="en-US" dirty="0"/>
         </a:p>
       </dgm:t>
     </dgm:pt>
@@ -4009,10 +4010,10 @@
         <a:lstStyle/>
         <a:p>
           <a:r>
-            <a:rPr lang="en-GB"/>
+            <a:rPr lang="en-GB" dirty="0"/>
             <a:t>Time constraints</a:t>
           </a:r>
-          <a:endParaRPr lang="en-US"/>
+          <a:endParaRPr lang="en-US" dirty="0"/>
         </a:p>
       </dgm:t>
     </dgm:pt>
@@ -4046,10 +4047,10 @@
         <a:lstStyle/>
         <a:p>
           <a:r>
-            <a:rPr lang="en-GB"/>
+            <a:rPr lang="en-GB" dirty="0"/>
             <a:t>Lack of experience</a:t>
           </a:r>
-          <a:endParaRPr lang="en-US"/>
+          <a:endParaRPr lang="en-US" dirty="0"/>
         </a:p>
       </dgm:t>
     </dgm:pt>
@@ -4083,10 +4084,10 @@
         <a:lstStyle/>
         <a:p>
           <a:r>
-            <a:rPr lang="en-GB"/>
+            <a:rPr lang="en-GB" dirty="0"/>
             <a:t>Beginning the project from scratch instead of IMS-Starter (not understanding the IMS-starter)</a:t>
           </a:r>
-          <a:endParaRPr lang="en-US"/>
+          <a:endParaRPr lang="en-US" dirty="0"/>
         </a:p>
       </dgm:t>
     </dgm:pt>
@@ -4120,10 +4121,10 @@
         <a:lstStyle/>
         <a:p>
           <a:r>
-            <a:rPr lang="en-GB"/>
+            <a:rPr lang="en-GB" dirty="0"/>
             <a:t>Lack of proper testing</a:t>
           </a:r>
-          <a:endParaRPr lang="en-US"/>
+          <a:endParaRPr lang="en-US" dirty="0"/>
         </a:p>
       </dgm:t>
     </dgm:pt>
@@ -4157,10 +4158,10 @@
         <a:lstStyle/>
         <a:p>
           <a:r>
-            <a:rPr lang="en-GB"/>
+            <a:rPr lang="en-GB" dirty="0"/>
             <a:t>Lack of .jar file</a:t>
           </a:r>
-          <a:endParaRPr lang="en-US"/>
+          <a:endParaRPr lang="en-US" dirty="0"/>
         </a:p>
       </dgm:t>
     </dgm:pt>
@@ -4194,10 +4195,10 @@
         <a:lstStyle/>
         <a:p>
           <a:r>
-            <a:rPr lang="en-GB"/>
+            <a:rPr lang="en-GB" dirty="0"/>
             <a:t>Losing a large chunk of my code base due to a crash</a:t>
           </a:r>
-          <a:endParaRPr lang="en-US"/>
+          <a:endParaRPr lang="en-US" dirty="0"/>
         </a:p>
       </dgm:t>
     </dgm:pt>
@@ -4231,10 +4232,10 @@
         <a:lstStyle/>
         <a:p>
           <a:r>
-            <a:rPr lang="en-GB"/>
+            <a:rPr lang="en-GB" dirty="0"/>
             <a:t>What went right?</a:t>
           </a:r>
-          <a:endParaRPr lang="en-US"/>
+          <a:endParaRPr lang="en-US" dirty="0"/>
         </a:p>
       </dgm:t>
     </dgm:pt>
@@ -4272,7 +4273,7 @@
             <a:rPr lang="en-GB" dirty="0">
               <a:latin typeface="Source Sans Pro"/>
             </a:rPr>
-            <a:t>The application is almost fully complete</a:t>
+            <a:t>The application is fully functional: Can update orders by adding or deleting items</a:t>
           </a:r>
           <a:endParaRPr lang="en-GB" dirty="0"/>
         </a:p>
@@ -4308,10 +4309,10 @@
         <a:lstStyle/>
         <a:p>
           <a:r>
-            <a:rPr lang="en-GB"/>
+            <a:rPr lang="en-GB" dirty="0"/>
             <a:t>I learned a lot, even if there is room for improvement</a:t>
           </a:r>
-          <a:endParaRPr lang="en-US"/>
+          <a:endParaRPr lang="en-US" dirty="0"/>
         </a:p>
       </dgm:t>
     </dgm:pt>
@@ -4336,31 +4337,6 @@
           <a:endParaRPr lang="en-US"/>
         </a:p>
       </dgm:t>
-    </dgm:pt>
-    <dgm:pt modelId="{62C985EF-CD47-4641-80F5-629FD9FA0940}">
-      <dgm:prSet phldr="0"/>
-      <dgm:spPr/>
-      <dgm:t>
-        <a:bodyPr/>
-        <a:lstStyle/>
-        <a:p>
-          <a:pPr rtl="0"/>
-          <a:r>
-            <a:rPr lang="en-GB" dirty="0">
-              <a:latin typeface="Source Sans Pro"/>
-            </a:rPr>
-            <a:t>Application is still not fully functional</a:t>
-          </a:r>
-        </a:p>
-      </dgm:t>
-    </dgm:pt>
-    <dgm:pt modelId="{95467EE2-04C6-4103-8307-59FFF3D620EF}" type="parTrans" cxnId="{CB142BAC-810F-40DD-83A3-603D6A64D5C0}">
-      <dgm:prSet/>
-      <dgm:spPr/>
-    </dgm:pt>
-    <dgm:pt modelId="{46D2F879-EE70-47DA-96A6-982B245296D4}" type="sibTrans" cxnId="{CB142BAC-810F-40DD-83A3-603D6A64D5C0}">
-      <dgm:prSet/>
-      <dgm:spPr/>
     </dgm:pt>
     <dgm:pt modelId="{F40B754E-E865-4D57-9916-BB3BE64FAA42}">
       <dgm:prSet phldr="0"/>
@@ -4447,38 +4423,36 @@
     </dgm:pt>
   </dgm:ptLst>
   <dgm:cxnLst>
-    <dgm:cxn modelId="{ACF85F00-9053-487D-8170-C0568CC7EDEB}" type="presOf" srcId="{5E61B7FE-35BD-4785-891B-947B9EFB61CD}" destId="{AF63A151-B45A-4216-B709-584A20CA4738}" srcOrd="0" destOrd="1" presId="urn:microsoft.com/office/officeart/2005/8/layout/hList1"/>
     <dgm:cxn modelId="{A38A5B01-37D2-418A-BEE9-096923C4D708}" type="presOf" srcId="{3DE2139A-29BE-44A9-85E3-ED0CA5CBA1C3}" destId="{91A0B2DF-8855-4BBB-819A-816F499D62B6}" srcOrd="0" destOrd="0" presId="urn:microsoft.com/office/officeart/2005/8/layout/hList1"/>
     <dgm:cxn modelId="{64BC5901-AAB0-4840-9987-D6DB1FE6547F}" srcId="{87395D90-5592-4D40-B8A9-08CD0E6CCB0A}" destId="{5E61B7FE-35BD-4785-891B-947B9EFB61CD}" srcOrd="1" destOrd="0" parTransId="{01EFBB6C-77A7-4BD4-9587-CB2D75F58558}" sibTransId="{3A679DB3-ACD8-43F5-B021-B3C0D5ABF59F}"/>
     <dgm:cxn modelId="{BB1A3803-4928-4084-A366-7562FD7BF475}" srcId="{3DE2139A-29BE-44A9-85E3-ED0CA5CBA1C3}" destId="{87395D90-5592-4D40-B8A9-08CD0E6CCB0A}" srcOrd="1" destOrd="0" parTransId="{DDF828BC-D46C-4E8B-9F08-FF29A200CA12}" sibTransId="{BA793189-A042-49F1-B0BA-5505803D3C6F}"/>
-    <dgm:cxn modelId="{5C9CD207-DB02-4205-947E-3E2880E5EE6F}" type="presOf" srcId="{F40B754E-E865-4D57-9916-BB3BE64FAA42}" destId="{AF63A151-B45A-4216-B709-584A20CA4738}" srcOrd="0" destOrd="2" presId="urn:microsoft.com/office/officeart/2005/8/layout/hList1"/>
     <dgm:cxn modelId="{85704413-57E4-45F8-A550-E8BA1CA45FF5}" srcId="{B0D76203-6F00-46DF-9914-E0BBD60554BD}" destId="{B140F4D4-EA40-441B-B5E7-EF438A0476EB}" srcOrd="4" destOrd="0" parTransId="{2A06E6B3-4B78-454B-B7DE-778F304CF2A5}" sibTransId="{66BB4200-BE9E-4A66-A325-6B07CD7E1E80}"/>
+    <dgm:cxn modelId="{7B696C16-F590-4805-B299-328FB2300172}" type="presOf" srcId="{2EC98996-1F18-4D71-96D8-CF6602F9948F}" destId="{EDE67029-2B3A-4889-A434-93761599E11E}" srcOrd="0" destOrd="3" presId="urn:microsoft.com/office/officeart/2005/8/layout/hList1"/>
     <dgm:cxn modelId="{7E430E17-E02A-4F9D-B59E-153B3DC71B50}" srcId="{3DE2139A-29BE-44A9-85E3-ED0CA5CBA1C3}" destId="{B0D76203-6F00-46DF-9914-E0BBD60554BD}" srcOrd="0" destOrd="0" parTransId="{CF990C60-E4BB-49BC-86E5-5BAA85B4FEFD}" sibTransId="{44E3D471-9100-47B3-8378-B28157618134}"/>
-    <dgm:cxn modelId="{F945B326-822A-425F-8068-02364751720B}" type="presOf" srcId="{806BA3C1-6FE9-4889-8F96-D4D0CB1F7C37}" destId="{AF63A151-B45A-4216-B709-584A20CA4738}" srcOrd="0" destOrd="0" presId="urn:microsoft.com/office/officeart/2005/8/layout/hList1"/>
+    <dgm:cxn modelId="{A3A2B31E-6386-4417-BD4B-2BC2E177F11F}" type="presOf" srcId="{634C703B-BC24-447A-BDCE-F76C6CC6B51C}" destId="{EDE67029-2B3A-4889-A434-93761599E11E}" srcOrd="0" destOrd="5" presId="urn:microsoft.com/office/officeart/2005/8/layout/hList1"/>
     <dgm:cxn modelId="{E4500733-0426-4165-AC63-9EB33378CDCC}" srcId="{87395D90-5592-4D40-B8A9-08CD0E6CCB0A}" destId="{806BA3C1-6FE9-4889-8F96-D4D0CB1F7C37}" srcOrd="0" destOrd="0" parTransId="{CB8439E3-7AE9-405D-889C-68CCDB24E530}" sibTransId="{17E7A13E-706C-4215-B8D2-258A243C1618}"/>
-    <dgm:cxn modelId="{99946965-74E9-4064-9AD5-0FEE85D7F605}" type="presOf" srcId="{F94AD105-5DAA-4A1E-A73E-9A8DAD4EBFD4}" destId="{EDE67029-2B3A-4889-A434-93761599E11E}" srcOrd="0" destOrd="1" presId="urn:microsoft.com/office/officeart/2005/8/layout/hList1"/>
+    <dgm:cxn modelId="{6A60E244-4BE3-497B-A6BB-6BADBD091C80}" type="presOf" srcId="{806BA3C1-6FE9-4889-8F96-D4D0CB1F7C37}" destId="{AF63A151-B45A-4216-B709-584A20CA4738}" srcOrd="0" destOrd="0" presId="urn:microsoft.com/office/officeart/2005/8/layout/hList1"/>
     <dgm:cxn modelId="{E1D38E6A-5E88-43B0-872D-7C365DCEA809}" srcId="{87395D90-5592-4D40-B8A9-08CD0E6CCB0A}" destId="{F40B754E-E865-4D57-9916-BB3BE64FAA42}" srcOrd="2" destOrd="0" parTransId="{7B6DFCEC-7E94-4A29-A06F-92380A8C9D28}" sibTransId="{17B89C50-E167-426C-B870-4BB9F0DF03DF}"/>
-    <dgm:cxn modelId="{1311284F-1509-494E-BC96-A3872288323E}" type="presOf" srcId="{B140F4D4-EA40-441B-B5E7-EF438A0476EB}" destId="{EDE67029-2B3A-4889-A434-93761599E11E}" srcOrd="0" destOrd="4" presId="urn:microsoft.com/office/officeart/2005/8/layout/hList1"/>
+    <dgm:cxn modelId="{2DDA976C-B2E4-4526-99D3-2AF94D2D41A0}" type="presOf" srcId="{87395D90-5592-4D40-B8A9-08CD0E6CCB0A}" destId="{FC2FC8B6-EC08-43D5-9203-33C35BBDEB7A}" srcOrd="0" destOrd="0" presId="urn:microsoft.com/office/officeart/2005/8/layout/hList1"/>
+    <dgm:cxn modelId="{84B5484F-ECD1-4D85-AB4D-EEE6418E0113}" type="presOf" srcId="{F94AD105-5DAA-4A1E-A73E-9A8DAD4EBFD4}" destId="{EDE67029-2B3A-4889-A434-93761599E11E}" srcOrd="0" destOrd="1" presId="urn:microsoft.com/office/officeart/2005/8/layout/hList1"/>
     <dgm:cxn modelId="{933BE570-2793-448B-8CDD-FFA13FAC245B}" srcId="{B0D76203-6F00-46DF-9914-E0BBD60554BD}" destId="{634C703B-BC24-447A-BDCE-F76C6CC6B51C}" srcOrd="5" destOrd="0" parTransId="{D9F93A60-F2EB-40DB-8A3A-9EEE6C85E5B0}" sibTransId="{5830B2D9-A1F5-41F3-BC11-123C83992D73}"/>
-    <dgm:cxn modelId="{6B8C4F52-EADF-4287-99E4-7E693C573E68}" type="presOf" srcId="{324BBF77-CEB1-49D8-BAA6-6B68F7416273}" destId="{EDE67029-2B3A-4889-A434-93761599E11E}" srcOrd="0" destOrd="0" presId="urn:microsoft.com/office/officeart/2005/8/layout/hList1"/>
+    <dgm:cxn modelId="{DF7E4677-56CD-4D07-A874-837AEC0FF941}" type="presOf" srcId="{B0D76203-6F00-46DF-9914-E0BBD60554BD}" destId="{50F4DD49-335C-4211-BC3C-2E0F7F228284}" srcOrd="0" destOrd="0" presId="urn:microsoft.com/office/officeart/2005/8/layout/hList1"/>
     <dgm:cxn modelId="{BCCDEB93-B35D-4B83-AAEA-D0397CF4788E}" srcId="{B0D76203-6F00-46DF-9914-E0BBD60554BD}" destId="{2EC98996-1F18-4D71-96D8-CF6602F9948F}" srcOrd="3" destOrd="0" parTransId="{D0A19289-6BC8-4AA8-8345-660D9177910C}" sibTransId="{B5F1D901-49D0-4295-861A-E203B9545BF1}"/>
-    <dgm:cxn modelId="{326C9A98-9520-44AD-BAA6-55955D49A8F7}" type="presOf" srcId="{62C985EF-CD47-4641-80F5-629FD9FA0940}" destId="{EDE67029-2B3A-4889-A434-93761599E11E}" srcOrd="0" destOrd="6" presId="urn:microsoft.com/office/officeart/2005/8/layout/hList1"/>
+    <dgm:cxn modelId="{A878849D-2A73-4BF7-9DE3-9F157257EF66}" type="presOf" srcId="{3C20E873-689D-4C72-A068-8046447E601F}" destId="{EDE67029-2B3A-4889-A434-93761599E11E}" srcOrd="0" destOrd="2" presId="urn:microsoft.com/office/officeart/2005/8/layout/hList1"/>
     <dgm:cxn modelId="{D494A19E-3063-46FA-8040-D6BE77C6E587}" srcId="{B0D76203-6F00-46DF-9914-E0BBD60554BD}" destId="{324BBF77-CEB1-49D8-BAA6-6B68F7416273}" srcOrd="0" destOrd="0" parTransId="{E73BED9B-B237-407E-A78B-C81EA7F7DA19}" sibTransId="{A789DA0C-DBF7-47A8-9E2F-FBDECE4EB99A}"/>
-    <dgm:cxn modelId="{86388BA5-8456-47DB-AD72-803AAA5731F3}" type="presOf" srcId="{87395D90-5592-4D40-B8A9-08CD0E6CCB0A}" destId="{FC2FC8B6-EC08-43D5-9203-33C35BBDEB7A}" srcOrd="0" destOrd="0" presId="urn:microsoft.com/office/officeart/2005/8/layout/hList1"/>
-    <dgm:cxn modelId="{971283A6-536B-4DD8-9FCF-A0204554D010}" type="presOf" srcId="{3C20E873-689D-4C72-A068-8046447E601F}" destId="{EDE67029-2B3A-4889-A434-93761599E11E}" srcOrd="0" destOrd="2" presId="urn:microsoft.com/office/officeart/2005/8/layout/hList1"/>
-    <dgm:cxn modelId="{CB142BAC-810F-40DD-83A3-603D6A64D5C0}" srcId="{B0D76203-6F00-46DF-9914-E0BBD60554BD}" destId="{62C985EF-CD47-4641-80F5-629FD9FA0940}" srcOrd="6" destOrd="0" parTransId="{95467EE2-04C6-4103-8307-59FFF3D620EF}" sibTransId="{46D2F879-EE70-47DA-96A6-982B245296D4}"/>
-    <dgm:cxn modelId="{B5F147AE-8008-4ABF-BE65-BC7B86E363E1}" type="presOf" srcId="{B0D76203-6F00-46DF-9914-E0BBD60554BD}" destId="{50F4DD49-335C-4211-BC3C-2E0F7F228284}" srcOrd="0" destOrd="0" presId="urn:microsoft.com/office/officeart/2005/8/layout/hList1"/>
     <dgm:cxn modelId="{E0A20BB1-9392-4176-9092-BFF80D8AB689}" srcId="{B0D76203-6F00-46DF-9914-E0BBD60554BD}" destId="{F94AD105-5DAA-4A1E-A73E-9A8DAD4EBFD4}" srcOrd="1" destOrd="0" parTransId="{5074582C-38DE-464A-B759-9420CABA4A30}" sibTransId="{82158845-03B9-4A69-A8EE-BFD14E985DA8}"/>
+    <dgm:cxn modelId="{2AF89CB8-C3B3-4E3A-B031-97C6AB6F97EB}" type="presOf" srcId="{324BBF77-CEB1-49D8-BAA6-6B68F7416273}" destId="{EDE67029-2B3A-4889-A434-93761599E11E}" srcOrd="0" destOrd="0" presId="urn:microsoft.com/office/officeart/2005/8/layout/hList1"/>
     <dgm:cxn modelId="{DC8F0ACB-CB93-46ED-BBC9-2D71A3C22D75}" srcId="{B0D76203-6F00-46DF-9914-E0BBD60554BD}" destId="{3C20E873-689D-4C72-A068-8046447E601F}" srcOrd="2" destOrd="0" parTransId="{D6A23284-500F-4F58-9D77-98D658377F8A}" sibTransId="{B30016B1-1CBE-495B-B106-0B6328FFD54D}"/>
-    <dgm:cxn modelId="{D6F36AED-6A35-4D0A-8CA8-8A7FD7696283}" type="presOf" srcId="{634C703B-BC24-447A-BDCE-F76C6CC6B51C}" destId="{EDE67029-2B3A-4889-A434-93761599E11E}" srcOrd="0" destOrd="5" presId="urn:microsoft.com/office/officeart/2005/8/layout/hList1"/>
-    <dgm:cxn modelId="{CCB295FB-593D-42C7-9B87-176E1F41B669}" type="presOf" srcId="{2EC98996-1F18-4D71-96D8-CF6602F9948F}" destId="{EDE67029-2B3A-4889-A434-93761599E11E}" srcOrd="0" destOrd="3" presId="urn:microsoft.com/office/officeart/2005/8/layout/hList1"/>
-    <dgm:cxn modelId="{FAF84B00-50DF-4195-A056-EA86899E8FC1}" type="presParOf" srcId="{91A0B2DF-8855-4BBB-819A-816F499D62B6}" destId="{3EAE2ECB-88B1-46AE-918B-3E2D5A7B01B3}" srcOrd="0" destOrd="0" presId="urn:microsoft.com/office/officeart/2005/8/layout/hList1"/>
-    <dgm:cxn modelId="{1872633D-BCD4-47CA-A5B6-D90D9A1E30C2}" type="presParOf" srcId="{3EAE2ECB-88B1-46AE-918B-3E2D5A7B01B3}" destId="{50F4DD49-335C-4211-BC3C-2E0F7F228284}" srcOrd="0" destOrd="0" presId="urn:microsoft.com/office/officeart/2005/8/layout/hList1"/>
-    <dgm:cxn modelId="{10C8E95A-838F-4608-863E-388E5E36FAA9}" type="presParOf" srcId="{3EAE2ECB-88B1-46AE-918B-3E2D5A7B01B3}" destId="{EDE67029-2B3A-4889-A434-93761599E11E}" srcOrd="1" destOrd="0" presId="urn:microsoft.com/office/officeart/2005/8/layout/hList1"/>
-    <dgm:cxn modelId="{09B610CE-1BF4-4859-BEBF-1CE6100A0AB9}" type="presParOf" srcId="{91A0B2DF-8855-4BBB-819A-816F499D62B6}" destId="{04CE720F-D432-46CC-B605-5898D1440C11}" srcOrd="1" destOrd="0" presId="urn:microsoft.com/office/officeart/2005/8/layout/hList1"/>
-    <dgm:cxn modelId="{6AE052EE-F9F2-412E-97E6-6F86CF38BF28}" type="presParOf" srcId="{91A0B2DF-8855-4BBB-819A-816F499D62B6}" destId="{7F76D53E-C666-4B27-B6A1-7F1878594383}" srcOrd="2" destOrd="0" presId="urn:microsoft.com/office/officeart/2005/8/layout/hList1"/>
-    <dgm:cxn modelId="{CA512405-33B4-45A5-8A22-739CF08B441E}" type="presParOf" srcId="{7F76D53E-C666-4B27-B6A1-7F1878594383}" destId="{FC2FC8B6-EC08-43D5-9203-33C35BBDEB7A}" srcOrd="0" destOrd="0" presId="urn:microsoft.com/office/officeart/2005/8/layout/hList1"/>
-    <dgm:cxn modelId="{E739F6EF-2D7C-4DC2-9065-D632A22A4F21}" type="presParOf" srcId="{7F76D53E-C666-4B27-B6A1-7F1878594383}" destId="{AF63A151-B45A-4216-B709-584A20CA4738}" srcOrd="1" destOrd="0" presId="urn:microsoft.com/office/officeart/2005/8/layout/hList1"/>
+    <dgm:cxn modelId="{D5A475D6-B374-42DC-B00A-4EF4FCF5FC92}" type="presOf" srcId="{B140F4D4-EA40-441B-B5E7-EF438A0476EB}" destId="{EDE67029-2B3A-4889-A434-93761599E11E}" srcOrd="0" destOrd="4" presId="urn:microsoft.com/office/officeart/2005/8/layout/hList1"/>
+    <dgm:cxn modelId="{BB12BBD9-EFC0-4364-97C4-31E688EDE7EB}" type="presOf" srcId="{F40B754E-E865-4D57-9916-BB3BE64FAA42}" destId="{AF63A151-B45A-4216-B709-584A20CA4738}" srcOrd="0" destOrd="2" presId="urn:microsoft.com/office/officeart/2005/8/layout/hList1"/>
+    <dgm:cxn modelId="{2623D3F6-1615-438B-AFF0-936A279FB1F7}" type="presOf" srcId="{5E61B7FE-35BD-4785-891B-947B9EFB61CD}" destId="{AF63A151-B45A-4216-B709-584A20CA4738}" srcOrd="0" destOrd="1" presId="urn:microsoft.com/office/officeart/2005/8/layout/hList1"/>
+    <dgm:cxn modelId="{F970C808-DA78-4C2E-BA2F-FCBE88BF777D}" type="presParOf" srcId="{91A0B2DF-8855-4BBB-819A-816F499D62B6}" destId="{3EAE2ECB-88B1-46AE-918B-3E2D5A7B01B3}" srcOrd="0" destOrd="0" presId="urn:microsoft.com/office/officeart/2005/8/layout/hList1"/>
+    <dgm:cxn modelId="{C22FF958-90AB-48CC-9AA8-17AA2678730D}" type="presParOf" srcId="{3EAE2ECB-88B1-46AE-918B-3E2D5A7B01B3}" destId="{50F4DD49-335C-4211-BC3C-2E0F7F228284}" srcOrd="0" destOrd="0" presId="urn:microsoft.com/office/officeart/2005/8/layout/hList1"/>
+    <dgm:cxn modelId="{F98560B8-6A0D-493B-9D4C-89250043AF67}" type="presParOf" srcId="{3EAE2ECB-88B1-46AE-918B-3E2D5A7B01B3}" destId="{EDE67029-2B3A-4889-A434-93761599E11E}" srcOrd="1" destOrd="0" presId="urn:microsoft.com/office/officeart/2005/8/layout/hList1"/>
+    <dgm:cxn modelId="{11DDD998-8C9B-444F-91AF-F16833BD22CE}" type="presParOf" srcId="{91A0B2DF-8855-4BBB-819A-816F499D62B6}" destId="{04CE720F-D432-46CC-B605-5898D1440C11}" srcOrd="1" destOrd="0" presId="urn:microsoft.com/office/officeart/2005/8/layout/hList1"/>
+    <dgm:cxn modelId="{1C249133-01B6-4037-AA62-745D41CDA1E2}" type="presParOf" srcId="{91A0B2DF-8855-4BBB-819A-816F499D62B6}" destId="{7F76D53E-C666-4B27-B6A1-7F1878594383}" srcOrd="2" destOrd="0" presId="urn:microsoft.com/office/officeart/2005/8/layout/hList1"/>
+    <dgm:cxn modelId="{CB8E66CA-FA44-4FDA-BA4D-A9BC8ABAA1BC}" type="presParOf" srcId="{7F76D53E-C666-4B27-B6A1-7F1878594383}" destId="{FC2FC8B6-EC08-43D5-9203-33C35BBDEB7A}" srcOrd="0" destOrd="0" presId="urn:microsoft.com/office/officeart/2005/8/layout/hList1"/>
+    <dgm:cxn modelId="{0AE6D3D5-C0FA-4391-820F-34824BDFE9E1}" type="presParOf" srcId="{7F76D53E-C666-4B27-B6A1-7F1878594383}" destId="{AF63A151-B45A-4216-B709-584A20CA4738}" srcOrd="1" destOrd="0" presId="urn:microsoft.com/office/officeart/2005/8/layout/hList1"/>
   </dgm:cxnLst>
   <dgm:bg/>
   <dgm:whole/>
@@ -5886,8 +5860,8 @@
       </dsp:nvSpPr>
       <dsp:spPr>
         <a:xfrm>
-          <a:off x="51" y="57451"/>
-          <a:ext cx="4913783" cy="604800"/>
+          <a:off x="51" y="45121"/>
+          <a:ext cx="4913783" cy="662400"/>
         </a:xfrm>
         <a:prstGeom prst="rect">
           <a:avLst/>
@@ -5929,12 +5903,12 @@
         </a:fontRef>
       </dsp:style>
       <dsp:txBody>
-        <a:bodyPr spcFirstLastPara="0" vert="horz" wrap="square" lIns="149352" tIns="85344" rIns="149352" bIns="85344" numCol="1" spcCol="1270" anchor="ctr" anchorCtr="0">
+        <a:bodyPr spcFirstLastPara="0" vert="horz" wrap="square" lIns="163576" tIns="93472" rIns="163576" bIns="93472" numCol="1" spcCol="1270" anchor="ctr" anchorCtr="0">
           <a:noAutofit/>
         </a:bodyPr>
         <a:lstStyle/>
         <a:p>
-          <a:pPr marL="0" lvl="0" indent="0" algn="ctr" defTabSz="933450">
+          <a:pPr marL="0" lvl="0" indent="0" algn="ctr" defTabSz="1022350">
             <a:lnSpc>
               <a:spcPct val="90000"/>
             </a:lnSpc>
@@ -5947,15 +5921,15 @@
             <a:buNone/>
           </a:pPr>
           <a:r>
-            <a:rPr lang="en-GB" sz="2100" kern="1200"/>
+            <a:rPr lang="en-GB" sz="2300" kern="1200" dirty="0"/>
             <a:t>What went wrong?</a:t>
           </a:r>
-          <a:endParaRPr lang="en-US" sz="2100" kern="1200"/>
+          <a:endParaRPr lang="en-US" sz="2300" kern="1200" dirty="0"/>
         </a:p>
       </dsp:txBody>
       <dsp:txXfrm>
-        <a:off x="51" y="57451"/>
-        <a:ext cx="4913783" cy="604800"/>
+        <a:off x="51" y="45121"/>
+        <a:ext cx="4913783" cy="662400"/>
       </dsp:txXfrm>
     </dsp:sp>
     <dsp:sp modelId="{EDE67029-2B3A-4889-A434-93761599E11E}">
@@ -5965,8 +5939,8 @@
       </dsp:nvSpPr>
       <dsp:spPr>
         <a:xfrm>
-          <a:off x="51" y="662251"/>
-          <a:ext cx="4913783" cy="3631635"/>
+          <a:off x="51" y="707521"/>
+          <a:ext cx="4913783" cy="3598695"/>
         </a:xfrm>
         <a:prstGeom prst="rect">
           <a:avLst/>
@@ -6010,12 +5984,12 @@
         <a:fontRef idx="minor"/>
       </dsp:style>
       <dsp:txBody>
-        <a:bodyPr spcFirstLastPara="0" vert="horz" wrap="square" lIns="112014" tIns="112014" rIns="149352" bIns="168021" numCol="1" spcCol="1270" anchor="t" anchorCtr="0">
+        <a:bodyPr spcFirstLastPara="0" vert="horz" wrap="square" lIns="122682" tIns="122682" rIns="163576" bIns="184023" numCol="1" spcCol="1270" anchor="t" anchorCtr="0">
           <a:noAutofit/>
         </a:bodyPr>
         <a:lstStyle/>
         <a:p>
-          <a:pPr marL="228600" lvl="1" indent="-228600" algn="l" defTabSz="933450">
+          <a:pPr marL="228600" lvl="1" indent="-228600" algn="l" defTabSz="1022350">
             <a:lnSpc>
               <a:spcPct val="90000"/>
             </a:lnSpc>
@@ -6028,13 +6002,13 @@
             <a:buChar char="•"/>
           </a:pPr>
           <a:r>
-            <a:rPr lang="en-GB" sz="2100" kern="1200"/>
+            <a:rPr lang="en-GB" sz="2300" kern="1200" dirty="0"/>
             <a:t>Time constraints</a:t>
           </a:r>
-          <a:endParaRPr lang="en-US" sz="2100" kern="1200"/>
+          <a:endParaRPr lang="en-US" sz="2300" kern="1200" dirty="0"/>
         </a:p>
         <a:p>
-          <a:pPr marL="228600" lvl="1" indent="-228600" algn="l" defTabSz="933450">
+          <a:pPr marL="228600" lvl="1" indent="-228600" algn="l" defTabSz="1022350">
             <a:lnSpc>
               <a:spcPct val="90000"/>
             </a:lnSpc>
@@ -6047,13 +6021,13 @@
             <a:buChar char="•"/>
           </a:pPr>
           <a:r>
-            <a:rPr lang="en-GB" sz="2100" kern="1200"/>
+            <a:rPr lang="en-GB" sz="2300" kern="1200" dirty="0"/>
             <a:t>Lack of experience</a:t>
           </a:r>
-          <a:endParaRPr lang="en-US" sz="2100" kern="1200"/>
+          <a:endParaRPr lang="en-US" sz="2300" kern="1200" dirty="0"/>
         </a:p>
         <a:p>
-          <a:pPr marL="228600" lvl="1" indent="-228600" algn="l" defTabSz="933450">
+          <a:pPr marL="228600" lvl="1" indent="-228600" algn="l" defTabSz="1022350">
             <a:lnSpc>
               <a:spcPct val="90000"/>
             </a:lnSpc>
@@ -6066,13 +6040,13 @@
             <a:buChar char="•"/>
           </a:pPr>
           <a:r>
-            <a:rPr lang="en-GB" sz="2100" kern="1200"/>
+            <a:rPr lang="en-GB" sz="2300" kern="1200" dirty="0"/>
             <a:t>Beginning the project from scratch instead of IMS-Starter (not understanding the IMS-starter)</a:t>
           </a:r>
-          <a:endParaRPr lang="en-US" sz="2100" kern="1200"/>
+          <a:endParaRPr lang="en-US" sz="2300" kern="1200" dirty="0"/>
         </a:p>
         <a:p>
-          <a:pPr marL="228600" lvl="1" indent="-228600" algn="l" defTabSz="933450">
+          <a:pPr marL="228600" lvl="1" indent="-228600" algn="l" defTabSz="1022350">
             <a:lnSpc>
               <a:spcPct val="90000"/>
             </a:lnSpc>
@@ -6085,13 +6059,13 @@
             <a:buChar char="•"/>
           </a:pPr>
           <a:r>
-            <a:rPr lang="en-GB" sz="2100" kern="1200"/>
+            <a:rPr lang="en-GB" sz="2300" kern="1200" dirty="0"/>
             <a:t>Lack of proper testing</a:t>
           </a:r>
-          <a:endParaRPr lang="en-US" sz="2100" kern="1200"/>
+          <a:endParaRPr lang="en-US" sz="2300" kern="1200" dirty="0"/>
         </a:p>
         <a:p>
-          <a:pPr marL="228600" lvl="1" indent="-228600" algn="l" defTabSz="933450">
+          <a:pPr marL="228600" lvl="1" indent="-228600" algn="l" defTabSz="1022350">
             <a:lnSpc>
               <a:spcPct val="90000"/>
             </a:lnSpc>
@@ -6104,13 +6078,13 @@
             <a:buChar char="•"/>
           </a:pPr>
           <a:r>
-            <a:rPr lang="en-GB" sz="2100" kern="1200"/>
+            <a:rPr lang="en-GB" sz="2300" kern="1200" dirty="0"/>
             <a:t>Lack of .jar file</a:t>
           </a:r>
-          <a:endParaRPr lang="en-US" sz="2100" kern="1200"/>
+          <a:endParaRPr lang="en-US" sz="2300" kern="1200" dirty="0"/>
         </a:p>
         <a:p>
-          <a:pPr marL="228600" lvl="1" indent="-228600" algn="l" defTabSz="933450">
+          <a:pPr marL="228600" lvl="1" indent="-228600" algn="l" defTabSz="1022350">
             <a:lnSpc>
               <a:spcPct val="90000"/>
             </a:lnSpc>
@@ -6123,35 +6097,15 @@
             <a:buChar char="•"/>
           </a:pPr>
           <a:r>
-            <a:rPr lang="en-GB" sz="2100" kern="1200"/>
+            <a:rPr lang="en-GB" sz="2300" kern="1200" dirty="0"/>
             <a:t>Losing a large chunk of my code base due to a crash</a:t>
           </a:r>
-          <a:endParaRPr lang="en-US" sz="2100" kern="1200"/>
-        </a:p>
-        <a:p>
-          <a:pPr marL="228600" lvl="1" indent="-228600" algn="l" defTabSz="933450" rtl="0">
-            <a:lnSpc>
-              <a:spcPct val="90000"/>
-            </a:lnSpc>
-            <a:spcBef>
-              <a:spcPct val="0"/>
-            </a:spcBef>
-            <a:spcAft>
-              <a:spcPct val="15000"/>
-            </a:spcAft>
-            <a:buChar char="•"/>
-          </a:pPr>
-          <a:r>
-            <a:rPr lang="en-GB" sz="2100" kern="1200" dirty="0">
-              <a:latin typeface="Source Sans Pro"/>
-            </a:rPr>
-            <a:t>Application is still not fully functional</a:t>
-          </a:r>
+          <a:endParaRPr lang="en-US" sz="2300" kern="1200" dirty="0"/>
         </a:p>
       </dsp:txBody>
       <dsp:txXfrm>
-        <a:off x="51" y="662251"/>
-        <a:ext cx="4913783" cy="3631635"/>
+        <a:off x="51" y="707521"/>
+        <a:ext cx="4913783" cy="3598695"/>
       </dsp:txXfrm>
     </dsp:sp>
     <dsp:sp modelId="{FC2FC8B6-EC08-43D5-9203-33C35BBDEB7A}">
@@ -6161,8 +6115,8 @@
       </dsp:nvSpPr>
       <dsp:spPr>
         <a:xfrm>
-          <a:off x="5601764" y="57451"/>
-          <a:ext cx="4913783" cy="604800"/>
+          <a:off x="5601764" y="45121"/>
+          <a:ext cx="4913783" cy="662400"/>
         </a:xfrm>
         <a:prstGeom prst="rect">
           <a:avLst/>
@@ -6204,12 +6158,12 @@
         </a:fontRef>
       </dsp:style>
       <dsp:txBody>
-        <a:bodyPr spcFirstLastPara="0" vert="horz" wrap="square" lIns="149352" tIns="85344" rIns="149352" bIns="85344" numCol="1" spcCol="1270" anchor="ctr" anchorCtr="0">
+        <a:bodyPr spcFirstLastPara="0" vert="horz" wrap="square" lIns="163576" tIns="93472" rIns="163576" bIns="93472" numCol="1" spcCol="1270" anchor="ctr" anchorCtr="0">
           <a:noAutofit/>
         </a:bodyPr>
         <a:lstStyle/>
         <a:p>
-          <a:pPr marL="0" lvl="0" indent="0" algn="ctr" defTabSz="933450">
+          <a:pPr marL="0" lvl="0" indent="0" algn="ctr" defTabSz="1022350">
             <a:lnSpc>
               <a:spcPct val="90000"/>
             </a:lnSpc>
@@ -6222,15 +6176,15 @@
             <a:buNone/>
           </a:pPr>
           <a:r>
-            <a:rPr lang="en-GB" sz="2100" kern="1200"/>
+            <a:rPr lang="en-GB" sz="2300" kern="1200" dirty="0"/>
             <a:t>What went right?</a:t>
           </a:r>
-          <a:endParaRPr lang="en-US" sz="2100" kern="1200"/>
+          <a:endParaRPr lang="en-US" sz="2300" kern="1200" dirty="0"/>
         </a:p>
       </dsp:txBody>
       <dsp:txXfrm>
-        <a:off x="5601764" y="57451"/>
-        <a:ext cx="4913783" cy="604800"/>
+        <a:off x="5601764" y="45121"/>
+        <a:ext cx="4913783" cy="662400"/>
       </dsp:txXfrm>
     </dsp:sp>
     <dsp:sp modelId="{AF63A151-B45A-4216-B709-584A20CA4738}">
@@ -6240,8 +6194,8 @@
       </dsp:nvSpPr>
       <dsp:spPr>
         <a:xfrm>
-          <a:off x="5601764" y="662251"/>
-          <a:ext cx="4913783" cy="3631635"/>
+          <a:off x="5601764" y="707521"/>
+          <a:ext cx="4913783" cy="3598695"/>
         </a:xfrm>
         <a:prstGeom prst="rect">
           <a:avLst/>
@@ -6285,12 +6239,12 @@
         <a:fontRef idx="minor"/>
       </dsp:style>
       <dsp:txBody>
-        <a:bodyPr spcFirstLastPara="0" vert="horz" wrap="square" lIns="112014" tIns="112014" rIns="149352" bIns="168021" numCol="1" spcCol="1270" anchor="t" anchorCtr="0">
+        <a:bodyPr spcFirstLastPara="0" vert="horz" wrap="square" lIns="122682" tIns="122682" rIns="163576" bIns="184023" numCol="1" spcCol="1270" anchor="t" anchorCtr="0">
           <a:noAutofit/>
         </a:bodyPr>
         <a:lstStyle/>
         <a:p>
-          <a:pPr marL="228600" lvl="1" indent="-228600" algn="l" defTabSz="933450" rtl="0">
+          <a:pPr marL="228600" lvl="1" indent="-228600" algn="l" defTabSz="1022350" rtl="0">
             <a:lnSpc>
               <a:spcPct val="90000"/>
             </a:lnSpc>
@@ -6303,15 +6257,15 @@
             <a:buChar char="•"/>
           </a:pPr>
           <a:r>
-            <a:rPr lang="en-GB" sz="2100" kern="1200" dirty="0">
+            <a:rPr lang="en-GB" sz="2300" kern="1200" dirty="0">
               <a:latin typeface="Source Sans Pro"/>
             </a:rPr>
-            <a:t>The application is almost fully complete</a:t>
+            <a:t>The application is fully functional: Can update orders by adding or deleting items</a:t>
           </a:r>
-          <a:endParaRPr lang="en-GB" sz="2100" kern="1200" dirty="0"/>
+          <a:endParaRPr lang="en-GB" sz="2300" kern="1200" dirty="0"/>
         </a:p>
         <a:p>
-          <a:pPr marL="228600" lvl="1" indent="-228600" algn="l" defTabSz="933450">
+          <a:pPr marL="228600" lvl="1" indent="-228600" algn="l" defTabSz="1022350">
             <a:lnSpc>
               <a:spcPct val="90000"/>
             </a:lnSpc>
@@ -6324,13 +6278,13 @@
             <a:buChar char="•"/>
           </a:pPr>
           <a:r>
-            <a:rPr lang="en-GB" sz="2100" kern="1200"/>
+            <a:rPr lang="en-GB" sz="2300" kern="1200" dirty="0"/>
             <a:t>I learned a lot, even if there is room for improvement</a:t>
           </a:r>
-          <a:endParaRPr lang="en-US" sz="2100" kern="1200"/>
+          <a:endParaRPr lang="en-US" sz="2300" kern="1200" dirty="0"/>
         </a:p>
         <a:p>
-          <a:pPr marL="228600" lvl="1" indent="-228600" algn="l" defTabSz="933450" rtl="0">
+          <a:pPr marL="228600" lvl="1" indent="-228600" algn="l" defTabSz="1022350" rtl="0">
             <a:lnSpc>
               <a:spcPct val="90000"/>
             </a:lnSpc>
@@ -6343,7 +6297,7 @@
             <a:buChar char="•"/>
           </a:pPr>
           <a:r>
-            <a:rPr lang="en-GB" sz="2100" kern="1200" dirty="0">
+            <a:rPr lang="en-GB" sz="2300" kern="1200" dirty="0">
               <a:latin typeface="Source Sans Pro"/>
             </a:rPr>
             <a:t>Given an extra week, the project could be fully finished. </a:t>
@@ -6351,8 +6305,8 @@
         </a:p>
       </dsp:txBody>
       <dsp:txXfrm>
-        <a:off x="5601764" y="662251"/>
-        <a:ext cx="4913783" cy="3631635"/>
+        <a:off x="5601764" y="707521"/>
+        <a:ext cx="4913783" cy="3598695"/>
       </dsp:txXfrm>
     </dsp:sp>
   </dsp:spTree>
@@ -24006,10 +23960,10 @@
       </p:sp>
       <p:pic>
         <p:nvPicPr>
-          <p:cNvPr id="5" name="Picture 5" descr="Text&#10;&#10;Description automatically generated">
+          <p:cNvPr id="4" name="Picture 5" descr="Table&#10;&#10;Description automatically generated">
             <a:extLst>
               <a:ext uri="{FF2B5EF4-FFF2-40B4-BE49-F238E27FC236}">
-                <a16:creationId xmlns:a16="http://schemas.microsoft.com/office/drawing/2014/main" id="{6D965EB9-B43D-4AD8-B280-A699CEF52881}"/>
+                <a16:creationId xmlns:a16="http://schemas.microsoft.com/office/drawing/2014/main" id="{C03F0CE8-A302-4A99-99CA-63278748FD31}"/>
               </a:ext>
             </a:extLst>
           </p:cNvPr>
@@ -24026,38 +23980,8 @@
         </p:blipFill>
         <p:spPr>
           <a:xfrm>
-            <a:off x="7396619" y="1150830"/>
-            <a:ext cx="4622105" cy="2980146"/>
-          </a:xfrm>
-          <a:prstGeom prst="rect">
-            <a:avLst/>
-          </a:prstGeom>
-        </p:spPr>
-      </p:pic>
-      <p:pic>
-        <p:nvPicPr>
-          <p:cNvPr id="3" name="Picture 6" descr="A screenshot of a video game&#10;&#10;Description automatically generated">
-            <a:extLst>
-              <a:ext uri="{FF2B5EF4-FFF2-40B4-BE49-F238E27FC236}">
-                <a16:creationId xmlns:a16="http://schemas.microsoft.com/office/drawing/2014/main" id="{187A4052-5AC2-4A2C-B4E2-D929F0AE92C3}"/>
-              </a:ext>
-            </a:extLst>
-          </p:cNvPr>
-          <p:cNvPicPr>
-            <a:picLocks noChangeAspect="1"/>
-          </p:cNvPicPr>
-          <p:nvPr/>
-        </p:nvPicPr>
-        <p:blipFill>
-          <a:blip r:embed="rId3"/>
-          <a:stretch>
-            <a:fillRect/>
-          </a:stretch>
-        </p:blipFill>
-        <p:spPr>
-          <a:xfrm>
-            <a:off x="-4176" y="1282962"/>
-            <a:ext cx="6835035" cy="3832789"/>
+            <a:off x="684619" y="1587161"/>
+            <a:ext cx="10550540" cy="4309977"/>
           </a:xfrm>
           <a:prstGeom prst="rect">
             <a:avLst/>

</xml_diff>